<commit_message>
Adjustment on power point
</commit_message>
<xml_diff>
--- a/ApresentacaoStreamAPI.pptx
+++ b/ApresentacaoStreamAPI.pptx
@@ -4606,17 +4606,7 @@
               <a:rPr lang="pt-BR" dirty="0">
                 <a:hlinkClick r:id="rId3"/>
               </a:rPr>
-              <a:t>https://app.rocketseat.com.br/me/</a:t>
-            </a:r>
-            <a:r>
-              <a:rPr lang="pt-BR" dirty="0" err="1">
-                <a:hlinkClick r:id="rId3"/>
-              </a:rPr>
-              <a:t>fuskinha</a:t>
-            </a:r>
-            <a:r>
-              <a:rPr lang="pt-BR" dirty="0"/>
-              <a:t>;</a:t>
+              <a:t>https://app.rocketseat.com.br/me/fuskinha</a:t>
             </a:r>
             <a:endParaRPr dirty="0"/>
           </a:p>
@@ -4638,17 +4628,7 @@
               <a:rPr lang="pt-BR" dirty="0">
                 <a:hlinkClick r:id="rId4"/>
               </a:rPr>
-              <a:t>https://www.linkedin.com/in/</a:t>
-            </a:r>
-            <a:r>
-              <a:rPr lang="pt-BR" dirty="0" err="1">
-                <a:hlinkClick r:id="rId4"/>
-              </a:rPr>
-              <a:t>pedrohenriquelacombe</a:t>
-            </a:r>
-            <a:r>
-              <a:rPr lang="pt-BR" dirty="0"/>
-              <a:t>;</a:t>
+              <a:t>https://www.linkedin.com/in/pedrohenriquelacombe</a:t>
             </a:r>
             <a:endParaRPr dirty="0"/>
           </a:p>
@@ -4670,18 +4650,9 @@
               <a:rPr lang="pt-BR" dirty="0">
                 <a:hlinkClick r:id="rId5"/>
               </a:rPr>
-              <a:t>https://github.com/</a:t>
-            </a:r>
-            <a:r>
-              <a:rPr lang="pt-BR" dirty="0" err="1">
-                <a:hlinkClick r:id="rId5"/>
-              </a:rPr>
-              <a:t>PedroLacombe</a:t>
-            </a:r>
-            <a:r>
-              <a:rPr lang="pt-BR" dirty="0"/>
-              <a:t>;</a:t>
-            </a:r>
+              <a:t>https://github.com/pedrohenriquelacombe</a:t>
+            </a:r>
+            <a:endParaRPr lang="pt-BR" dirty="0"/>
           </a:p>
           <a:p>
             <a:pPr marL="914400" lvl="1" indent="-317500" algn="l" rtl="0">
@@ -5738,7 +5709,7 @@
               <a:rPr lang="pt-BR" dirty="0">
                 <a:hlinkClick r:id="rId4"/>
               </a:rPr>
-              <a:t>https://github.com/PedroLacombe</a:t>
+              <a:t>https://github.com/pedrohenriquelacombe</a:t>
             </a:r>
             <a:endParaRPr lang="pt-BR" dirty="0"/>
           </a:p>

</xml_diff>